<commit_message>
Modules and Web Apps
</commit_message>
<xml_diff>
--- a/Hands-on Modules/Embedding/1. What is Power BI Embedded.pptx
+++ b/Hands-on Modules/Embedding/1. What is Power BI Embedded.pptx
@@ -778,7 +778,7 @@
           <a:p>
             <a:fld id="{35A2D088-BDBD-41A5-ADCE-5C6A4DC08057}" type="datetime8">
               <a:rPr lang="en-US" smtClean="0"/>
-              <a:t>2/27/2019 1:06 PM</a:t>
+              <a:t>2/27/2019 5:08 PM</a:t>
             </a:fld>
             <a:endParaRPr lang="en-US" dirty="0"/>
           </a:p>
@@ -1130,7 +1130,7 @@
           <a:p>
             <a:fld id="{35A2D088-BDBD-41A5-ADCE-5C6A4DC08057}" type="datetime8">
               <a:rPr lang="en-US" smtClean="0"/>
-              <a:t>2/27/2019 1:09 PM</a:t>
+              <a:t>2/27/2019 5:08 PM</a:t>
             </a:fld>
             <a:endParaRPr lang="en-US" dirty="0"/>
           </a:p>
@@ -1311,7 +1311,7 @@
           <a:p>
             <a:fld id="{35A2D088-BDBD-41A5-ADCE-5C6A4DC08057}" type="datetime8">
               <a:rPr lang="en-US" smtClean="0"/>
-              <a:t>2/27/2019 1:06 PM</a:t>
+              <a:t>2/27/2019 5:08 PM</a:t>
             </a:fld>
             <a:endParaRPr lang="en-US" dirty="0"/>
           </a:p>
@@ -1461,7 +1461,7 @@
                   <a:prstClr val="black"/>
                 </a:solidFill>
               </a:rPr>
-              <a:t>2/27/2019 1:06 PM</a:t>
+              <a:t>2/27/2019 5:13 PM</a:t>
             </a:fld>
             <a:endParaRPr lang="en-US" dirty="0">
               <a:solidFill>
@@ -15703,8 +15703,8 @@
         </p:nvSpPr>
         <p:spPr>
           <a:xfrm>
-            <a:off x="839788" y="1877210"/>
-            <a:ext cx="5157787" cy="572465"/>
+            <a:off x="839788" y="1960310"/>
+            <a:ext cx="5157787" cy="406265"/>
           </a:xfrm>
         </p:spPr>
         <p:txBody>
@@ -15737,7 +15737,7 @@
         <p:spPr>
           <a:xfrm>
             <a:off x="839788" y="2505075"/>
-            <a:ext cx="5157787" cy="2179058"/>
+            <a:ext cx="5157787" cy="849463"/>
           </a:xfrm>
         </p:spPr>
         <p:txBody>
@@ -15745,43 +15745,43 @@
           <a:lstStyle/>
           <a:p>
             <a:r>
-              <a:rPr lang="en-US" sz="2400" b="1" dirty="0"/>
+              <a:rPr lang="en-US" sz="1600" b="1" dirty="0"/>
               <a:t>Dashboards</a:t>
             </a:r>
             <a:r>
-              <a:rPr lang="en-US" sz="2400" dirty="0"/>
+              <a:rPr lang="en-US" sz="1600" dirty="0"/>
               <a:t> and </a:t>
             </a:r>
             <a:r>
-              <a:rPr lang="en-US" sz="2400" b="1" dirty="0"/>
+              <a:rPr lang="en-US" sz="1600" b="1" dirty="0"/>
               <a:t>tiles</a:t>
             </a:r>
             <a:r>
-              <a:rPr lang="en-US" sz="2400" dirty="0"/>
+              <a:rPr lang="en-US" sz="1600" dirty="0"/>
               <a:t> that are built from content pack datasets </a:t>
             </a:r>
             <a:r>
-              <a:rPr lang="en-US" sz="2400" i="1" dirty="0"/>
+              <a:rPr lang="en-US" sz="1600" i="1" dirty="0"/>
               <a:t>cannot</a:t>
             </a:r>
             <a:r>
-              <a:rPr lang="en-US" sz="2400" dirty="0"/>
+              <a:rPr lang="en-US" sz="1600" dirty="0"/>
               <a:t> be embedded, however, </a:t>
             </a:r>
             <a:r>
-              <a:rPr lang="en-US" sz="2400" b="1" dirty="0"/>
+              <a:rPr lang="en-US" sz="1600" b="1" dirty="0"/>
               <a:t>reports</a:t>
             </a:r>
             <a:r>
-              <a:rPr lang="en-US" sz="2400" dirty="0"/>
+              <a:rPr lang="en-US" sz="1600" dirty="0"/>
               <a:t> built from a content pack dataset </a:t>
             </a:r>
             <a:r>
-              <a:rPr lang="en-US" sz="2400" i="1" dirty="0"/>
+              <a:rPr lang="en-US" sz="1600" i="1" dirty="0"/>
               <a:t>can</a:t>
             </a:r>
             <a:r>
-              <a:rPr lang="en-US" sz="2400" dirty="0"/>
+              <a:rPr lang="en-US" sz="1600" dirty="0"/>
               <a:t> be embedded.</a:t>
             </a:r>
           </a:p>
@@ -15805,8 +15805,8 @@
         </p:nvSpPr>
         <p:spPr>
           <a:xfrm>
-            <a:off x="6172200" y="1877210"/>
-            <a:ext cx="5183188" cy="572465"/>
+            <a:off x="6172200" y="1960310"/>
+            <a:ext cx="5183188" cy="406265"/>
           </a:xfrm>
         </p:spPr>
         <p:txBody>
@@ -15839,7 +15839,7 @@
         <p:spPr>
           <a:xfrm>
             <a:off x="6172200" y="2505075"/>
-            <a:ext cx="5183188" cy="3459409"/>
+            <a:ext cx="5183188" cy="3927229"/>
           </a:xfrm>
         </p:spPr>
         <p:txBody>
@@ -15847,86 +15847,86 @@
           <a:lstStyle/>
           <a:p>
             <a:r>
-              <a:rPr lang="en-US" sz="1400" dirty="0"/>
+              <a:rPr lang="en-US" sz="1600" dirty="0"/>
               <a:t>Australia Southeast, </a:t>
             </a:r>
           </a:p>
           <a:p>
             <a:r>
-              <a:rPr lang="en-US" sz="1400" dirty="0"/>
+              <a:rPr lang="en-US" sz="1600" dirty="0"/>
               <a:t>Brazil South, </a:t>
             </a:r>
           </a:p>
           <a:p>
             <a:r>
-              <a:rPr lang="en-US" sz="1400" dirty="0"/>
+              <a:rPr lang="en-US" sz="1600" dirty="0"/>
               <a:t>Canada Central, </a:t>
             </a:r>
           </a:p>
           <a:p>
             <a:r>
-              <a:rPr lang="en-US" sz="1400" dirty="0"/>
+              <a:rPr lang="en-US" sz="1600" dirty="0"/>
               <a:t>East US 2, </a:t>
             </a:r>
           </a:p>
           <a:p>
             <a:r>
-              <a:rPr lang="en-US" sz="1400" dirty="0"/>
+              <a:rPr lang="en-US" sz="1600" dirty="0"/>
               <a:t>India West, </a:t>
             </a:r>
           </a:p>
           <a:p>
             <a:r>
-              <a:rPr lang="en-US" sz="1400" dirty="0"/>
+              <a:rPr lang="en-US" sz="1600" dirty="0"/>
               <a:t>Japan East, </a:t>
             </a:r>
           </a:p>
           <a:p>
             <a:r>
-              <a:rPr lang="en-US" sz="1400" dirty="0"/>
+              <a:rPr lang="en-US" sz="1600" dirty="0"/>
               <a:t>North Central US, </a:t>
             </a:r>
           </a:p>
           <a:p>
             <a:r>
-              <a:rPr lang="en-US" sz="1400" dirty="0"/>
+              <a:rPr lang="en-US" sz="1600" dirty="0"/>
               <a:t>North Europe, </a:t>
             </a:r>
           </a:p>
           <a:p>
             <a:r>
-              <a:rPr lang="en-US" sz="1400" dirty="0"/>
+              <a:rPr lang="en-US" sz="1600" dirty="0"/>
               <a:t>South Central US, </a:t>
             </a:r>
           </a:p>
           <a:p>
             <a:r>
-              <a:rPr lang="en-US" sz="1400" dirty="0"/>
+              <a:rPr lang="en-US" sz="1600" dirty="0"/>
               <a:t>Southeast Asia, </a:t>
             </a:r>
           </a:p>
           <a:p>
             <a:r>
-              <a:rPr lang="en-US" sz="1400" dirty="0"/>
+              <a:rPr lang="en-US" sz="1600" dirty="0"/>
               <a:t>UK South, </a:t>
             </a:r>
           </a:p>
           <a:p>
             <a:r>
-              <a:rPr lang="en-US" sz="1400" dirty="0"/>
+              <a:rPr lang="en-US" sz="1600" dirty="0"/>
               <a:t>West Europe, </a:t>
             </a:r>
           </a:p>
           <a:p>
             <a:r>
-              <a:rPr lang="en-US" sz="1400" dirty="0"/>
-              <a:t>West US, and </a:t>
-            </a:r>
-          </a:p>
-          <a:p>
-            <a:r>
-              <a:rPr lang="en-US" sz="1400" dirty="0"/>
-              <a:t>West US 2.</a:t>
+              <a:rPr lang="en-US" sz="1600" dirty="0"/>
+              <a:t>West US,</a:t>
+            </a:r>
+          </a:p>
+          <a:p>
+            <a:r>
+              <a:rPr lang="en-US" sz="1600" dirty="0"/>
+              <a:t>West US 2</a:t>
             </a:r>
           </a:p>
         </p:txBody>
@@ -16007,8 +16007,8 @@
         </p:nvSpPr>
         <p:spPr>
           <a:xfrm>
-            <a:off x="839788" y="1655612"/>
-            <a:ext cx="5157787" cy="849463"/>
+            <a:off x="839788" y="1877211"/>
+            <a:ext cx="5157787" cy="627864"/>
           </a:xfrm>
         </p:spPr>
         <p:txBody>
@@ -16016,7 +16016,7 @@
           <a:lstStyle/>
           <a:p>
             <a:r>
-              <a:rPr lang="en-US" dirty="0"/>
+              <a:rPr lang="en-US" sz="1600" dirty="0"/>
               <a:t>How can I monitor Power BI Embedded capacity consumption?</a:t>
             </a:r>
           </a:p>
@@ -16041,7 +16041,7 @@
         <p:spPr>
           <a:xfrm>
             <a:off x="839788" y="2505075"/>
-            <a:ext cx="5157787" cy="1661993"/>
+            <a:ext cx="5157787" cy="947952"/>
           </a:xfrm>
         </p:spPr>
         <p:txBody>
@@ -16049,7 +16049,7 @@
           <a:lstStyle/>
           <a:p>
             <a:r>
-              <a:rPr lang="en-US" sz="2400" dirty="0">
+              <a:rPr lang="en-US" sz="1600" dirty="0">
                 <a:solidFill>
                   <a:schemeClr val="tx1"/>
                 </a:solidFill>
@@ -16057,7 +16057,7 @@
               <a:t>Using the </a:t>
             </a:r>
             <a:r>
-              <a:rPr lang="en-US" sz="2400" u="sng" dirty="0">
+              <a:rPr lang="en-US" sz="1600" u="sng" dirty="0">
                 <a:solidFill>
                   <a:schemeClr val="tx1"/>
                 </a:solidFill>
@@ -16072,7 +16072,7 @@
               <a:t>Power BI Admin portal</a:t>
             </a:r>
             <a:r>
-              <a:rPr lang="en-US" sz="2400" dirty="0">
+              <a:rPr lang="en-US" sz="1600" dirty="0">
                 <a:solidFill>
                   <a:schemeClr val="tx1"/>
                 </a:solidFill>
@@ -16082,7 +16082,7 @@
           </a:p>
           <a:p>
             <a:r>
-              <a:rPr lang="en-US" sz="2400" dirty="0">
+              <a:rPr lang="en-US" sz="1600" dirty="0">
                 <a:solidFill>
                   <a:schemeClr val="tx1"/>
                 </a:solidFill>
@@ -16090,7 +16090,7 @@
               <a:t>Downloading the </a:t>
             </a:r>
             <a:r>
-              <a:rPr lang="en-US" sz="2400" u="sng" dirty="0">
+              <a:rPr lang="en-US" sz="1600" u="sng" dirty="0">
                 <a:solidFill>
                   <a:schemeClr val="tx1"/>
                 </a:solidFill>
@@ -16105,7 +16105,7 @@
               <a:t>metric app</a:t>
             </a:r>
             <a:r>
-              <a:rPr lang="en-US" sz="2400" dirty="0">
+              <a:rPr lang="en-US" sz="1600" dirty="0">
                 <a:solidFill>
                   <a:schemeClr val="tx1"/>
                 </a:solidFill>
@@ -16115,7 +16115,7 @@
           </a:p>
           <a:p>
             <a:r>
-              <a:rPr lang="en-US" sz="2400" dirty="0">
+              <a:rPr lang="en-US" sz="1600" dirty="0">
                 <a:solidFill>
                   <a:schemeClr val="tx1"/>
                 </a:solidFill>
@@ -16123,7 +16123,7 @@
               <a:t>Using </a:t>
             </a:r>
             <a:r>
-              <a:rPr lang="en-US" sz="2400" u="sng" dirty="0">
+              <a:rPr lang="en-US" sz="1600" u="sng" dirty="0">
                 <a:solidFill>
                   <a:schemeClr val="tx1"/>
                 </a:solidFill>
@@ -16138,7 +16138,7 @@
               <a:t>Azure diagnostic logging</a:t>
             </a:r>
             <a:r>
-              <a:rPr lang="en-US" sz="2400" dirty="0">
+              <a:rPr lang="en-US" sz="1600" dirty="0">
                 <a:solidFill>
                   <a:schemeClr val="tx1"/>
                 </a:solidFill>
@@ -16166,8 +16166,8 @@
         </p:nvSpPr>
         <p:spPr>
           <a:xfrm>
-            <a:off x="6172200" y="1690688"/>
-            <a:ext cx="5183188" cy="517065"/>
+            <a:off x="6169024" y="1877211"/>
+            <a:ext cx="5183188" cy="406265"/>
           </a:xfrm>
         </p:spPr>
         <p:txBody>
@@ -16175,7 +16175,7 @@
           <a:lstStyle/>
           <a:p>
             <a:r>
-              <a:rPr lang="en-US" dirty="0"/>
+              <a:rPr lang="en-US" sz="1600" dirty="0"/>
               <a:t>What is the Power BI Service?</a:t>
             </a:r>
           </a:p>
@@ -16200,7 +16200,7 @@
         <p:spPr>
           <a:xfrm>
             <a:off x="6172200" y="2505075"/>
-            <a:ext cx="5183188" cy="3065455"/>
+            <a:ext cx="5183188" cy="1883593"/>
           </a:xfrm>
         </p:spPr>
         <p:txBody>
@@ -16208,7 +16208,7 @@
           <a:lstStyle/>
           <a:p>
             <a:r>
-              <a:rPr lang="en-US" sz="2400" dirty="0">
+              <a:rPr lang="en-US" sz="1600" dirty="0">
                 <a:solidFill>
                   <a:schemeClr val="tx1"/>
                 </a:solidFill>
@@ -16218,7 +16218,7 @@
           </a:p>
           <a:p>
             <a:r>
-              <a:rPr lang="en-US" sz="2400" dirty="0">
+              <a:rPr lang="en-US" sz="1600" dirty="0">
                 <a:solidFill>
                   <a:schemeClr val="tx1"/>
                 </a:solidFill>
@@ -16228,7 +16228,7 @@
           </a:p>
           <a:p>
             <a:r>
-              <a:rPr lang="en-US" sz="2400" dirty="0">
+              <a:rPr lang="en-US" sz="1600" dirty="0">
                 <a:solidFill>
                   <a:schemeClr val="tx1"/>
                 </a:solidFill>
@@ -16238,7 +16238,7 @@
           </a:p>
           <a:p>
             <a:r>
-              <a:rPr lang="en-US" sz="2400" dirty="0">
+              <a:rPr lang="en-US" sz="1600" dirty="0">
                 <a:solidFill>
                   <a:schemeClr val="tx1"/>
                 </a:solidFill>
@@ -16324,8 +16324,8 @@
         </p:nvSpPr>
         <p:spPr>
           <a:xfrm>
-            <a:off x="839788" y="1766411"/>
-            <a:ext cx="5157787" cy="738664"/>
+            <a:off x="839788" y="1877211"/>
+            <a:ext cx="5157787" cy="627864"/>
           </a:xfrm>
         </p:spPr>
         <p:txBody>
@@ -16333,7 +16333,7 @@
           <a:lstStyle/>
           <a:p>
             <a:r>
-              <a:rPr lang="en-US" sz="2000" dirty="0"/>
+              <a:rPr lang="en-US" sz="1600" dirty="0"/>
               <a:t>What is the PBI Embedded dedicated capacity role in a PBI Embedded solution?</a:t>
             </a:r>
           </a:p>
@@ -16358,7 +16358,7 @@
         <p:spPr>
           <a:xfrm>
             <a:off x="839788" y="2505075"/>
-            <a:ext cx="5157787" cy="2179058"/>
+            <a:ext cx="5157787" cy="1071062"/>
           </a:xfrm>
         </p:spPr>
         <p:txBody>
@@ -16366,7 +16366,7 @@
           <a:lstStyle/>
           <a:p>
             <a:r>
-              <a:rPr lang="en-US" sz="2400" dirty="0">
+              <a:rPr lang="en-US" sz="1600" dirty="0">
                 <a:solidFill>
                   <a:schemeClr val="tx1"/>
                 </a:solidFill>
@@ -16374,7 +16374,7 @@
               <a:t>To </a:t>
             </a:r>
             <a:r>
-              <a:rPr lang="en-US" sz="2400" u="sng" dirty="0">
+              <a:rPr lang="en-US" sz="1600" u="sng" dirty="0">
                 <a:solidFill>
                   <a:schemeClr val="tx1"/>
                 </a:solidFill>
@@ -16389,7 +16389,7 @@
               <a:t>promote your solution to production</a:t>
             </a:r>
             <a:r>
-              <a:rPr lang="en-US" sz="2400" dirty="0">
+              <a:rPr lang="en-US" sz="1600" dirty="0">
                 <a:solidFill>
                   <a:schemeClr val="tx1"/>
                 </a:solidFill>
@@ -16417,8 +16417,8 @@
         </p:nvSpPr>
         <p:spPr>
           <a:xfrm>
-            <a:off x="6172200" y="1655612"/>
-            <a:ext cx="5183188" cy="849463"/>
+            <a:off x="6169024" y="1877211"/>
+            <a:ext cx="5183188" cy="406265"/>
           </a:xfrm>
         </p:spPr>
         <p:txBody>
@@ -16426,7 +16426,7 @@
           <a:lstStyle/>
           <a:p>
             <a:r>
-              <a:rPr lang="en-US" dirty="0"/>
+              <a:rPr lang="en-US" sz="1600" dirty="0"/>
               <a:t>What type of content pack data can be embedded?</a:t>
             </a:r>
           </a:p>
@@ -16451,7 +16451,7 @@
         <p:spPr>
           <a:xfrm>
             <a:off x="6172200" y="2505075"/>
-            <a:ext cx="5183188" cy="2179058"/>
+            <a:ext cx="5183188" cy="849463"/>
           </a:xfrm>
         </p:spPr>
         <p:txBody>
@@ -16459,43 +16459,43 @@
           <a:lstStyle/>
           <a:p>
             <a:r>
-              <a:rPr lang="en-US" sz="2400" b="1" dirty="0"/>
+              <a:rPr lang="en-US" sz="1600" b="1" dirty="0"/>
               <a:t>Dashboards</a:t>
             </a:r>
             <a:r>
-              <a:rPr lang="en-US" sz="2400" dirty="0"/>
+              <a:rPr lang="en-US" sz="1600" dirty="0"/>
               <a:t> and </a:t>
             </a:r>
             <a:r>
-              <a:rPr lang="en-US" sz="2400" b="1" dirty="0"/>
+              <a:rPr lang="en-US" sz="1600" b="1" dirty="0"/>
               <a:t>tiles</a:t>
             </a:r>
             <a:r>
-              <a:rPr lang="en-US" sz="2400" dirty="0"/>
+              <a:rPr lang="en-US" sz="1600" dirty="0"/>
               <a:t> that are built from content pack datasets </a:t>
             </a:r>
             <a:r>
-              <a:rPr lang="en-US" sz="2400" i="1" dirty="0"/>
+              <a:rPr lang="en-US" sz="1600" i="1" dirty="0"/>
               <a:t>cannot</a:t>
             </a:r>
             <a:r>
-              <a:rPr lang="en-US" sz="2400" dirty="0"/>
+              <a:rPr lang="en-US" sz="1600" dirty="0"/>
               <a:t> be embedded, however, </a:t>
             </a:r>
             <a:r>
-              <a:rPr lang="en-US" sz="2400" b="1" dirty="0"/>
+              <a:rPr lang="en-US" sz="1600" b="1" dirty="0"/>
               <a:t>reports</a:t>
             </a:r>
             <a:r>
-              <a:rPr lang="en-US" sz="2400" dirty="0"/>
+              <a:rPr lang="en-US" sz="1600" dirty="0"/>
               <a:t> built from a content pack dataset </a:t>
             </a:r>
             <a:r>
-              <a:rPr lang="en-US" sz="2400" i="1" dirty="0"/>
+              <a:rPr lang="en-US" sz="1600" i="1" dirty="0"/>
               <a:t>can</a:t>
             </a:r>
             <a:r>
-              <a:rPr lang="en-US" sz="2400" dirty="0"/>
+              <a:rPr lang="en-US" sz="1600" dirty="0"/>
               <a:t> be embedded.</a:t>
             </a:r>
           </a:p>
@@ -16577,8 +16577,8 @@
         </p:nvSpPr>
         <p:spPr>
           <a:xfrm>
-            <a:off x="839788" y="1655612"/>
-            <a:ext cx="5157787" cy="849463"/>
+            <a:off x="839788" y="1877211"/>
+            <a:ext cx="5157787" cy="627864"/>
           </a:xfrm>
         </p:spPr>
         <p:txBody>
@@ -16586,7 +16586,7 @@
           <a:lstStyle/>
           <a:p>
             <a:r>
-              <a:rPr lang="en-US" dirty="0"/>
+              <a:rPr lang="en-US" sz="1600" dirty="0"/>
               <a:t>What is the authentication model for Power BI Embedded?</a:t>
             </a:r>
           </a:p>
@@ -16960,8 +16960,8 @@
         </p:nvSpPr>
         <p:spPr>
           <a:xfrm>
-            <a:off x="839788" y="1655612"/>
-            <a:ext cx="5157787" cy="849463"/>
+            <a:off x="836612" y="1655612"/>
+            <a:ext cx="5157787" cy="406265"/>
           </a:xfrm>
         </p:spPr>
         <p:txBody>
@@ -16969,7 +16969,7 @@
           <a:lstStyle/>
           <a:p>
             <a:r>
-              <a:rPr lang="en-US" dirty="0"/>
+              <a:rPr lang="en-US" sz="1600" dirty="0"/>
               <a:t>How do I purchase Power BI Embedded?</a:t>
             </a:r>
           </a:p>
@@ -16994,7 +16994,7 @@
         <p:spPr>
           <a:xfrm>
             <a:off x="839788" y="2505075"/>
-            <a:ext cx="5157787" cy="849463"/>
+            <a:ext cx="5157787" cy="406265"/>
           </a:xfrm>
         </p:spPr>
         <p:txBody>
@@ -17002,7 +17002,7 @@
           <a:lstStyle/>
           <a:p>
             <a:r>
-              <a:rPr lang="en-US" sz="2400" dirty="0"/>
+              <a:rPr lang="en-US" sz="1600" dirty="0"/>
               <a:t>Power BI Embedded is available through Azure.</a:t>
             </a:r>
           </a:p>
@@ -17060,7 +17060,7 @@
         <p:spPr>
           <a:xfrm>
             <a:off x="6172200" y="2505075"/>
-            <a:ext cx="5183188" cy="2511457"/>
+            <a:ext cx="5183188" cy="1071062"/>
           </a:xfrm>
         </p:spPr>
         <p:txBody>
@@ -17068,7 +17068,7 @@
           <a:lstStyle/>
           <a:p>
             <a:r>
-              <a:rPr lang="en-US" sz="2400" dirty="0"/>
+              <a:rPr lang="en-US" sz="1600" dirty="0"/>
               <a:t>Customers continue to pay for any existing Power BI Premium purchases until the end of their current agreement term and then may switch their Power BI Premium purchases as necessary at that point.</a:t>
             </a:r>
           </a:p>
@@ -17218,8 +17218,8 @@
         </p:nvSpPr>
         <p:spPr>
           <a:xfrm>
-            <a:off x="839788" y="1766411"/>
-            <a:ext cx="5157787" cy="738664"/>
+            <a:off x="839788" y="1877211"/>
+            <a:ext cx="5157787" cy="627864"/>
           </a:xfrm>
         </p:spPr>
         <p:txBody>
@@ -17227,7 +17227,7 @@
           <a:lstStyle/>
           <a:p>
             <a:r>
-              <a:rPr lang="en-US" sz="2000" dirty="0"/>
+              <a:rPr lang="en-US" sz="1600" dirty="0"/>
               <a:t>Do I still have to buy Power BI Premium to get access to Power BI Embedded?</a:t>
             </a:r>
           </a:p>
@@ -17252,7 +17252,7 @@
         <p:spPr>
           <a:xfrm>
             <a:off x="839788" y="2505075"/>
-            <a:ext cx="5157787" cy="1514261"/>
+            <a:ext cx="5157787" cy="849463"/>
           </a:xfrm>
         </p:spPr>
         <p:txBody>
@@ -17260,7 +17260,7 @@
           <a:lstStyle/>
           <a:p>
             <a:r>
-              <a:rPr lang="en-US" sz="2400" dirty="0"/>
+              <a:rPr lang="en-US" sz="1600" dirty="0"/>
               <a:t>No, Power BI Embedded includes the Azure-based capacity that you need to deploy and distribute your solution to customers.</a:t>
             </a:r>
           </a:p>
@@ -17284,8 +17284,8 @@
         </p:nvSpPr>
         <p:spPr>
           <a:xfrm>
-            <a:off x="6172200" y="1655612"/>
-            <a:ext cx="5183188" cy="849463"/>
+            <a:off x="6172200" y="1877211"/>
+            <a:ext cx="5183188" cy="627864"/>
           </a:xfrm>
         </p:spPr>
         <p:txBody>
@@ -17293,7 +17293,7 @@
           <a:lstStyle/>
           <a:p>
             <a:r>
-              <a:rPr lang="en-US" dirty="0"/>
+              <a:rPr lang="en-US" sz="1600" dirty="0"/>
               <a:t>What’s the purchase commitment for Power BI Embedded?</a:t>
             </a:r>
           </a:p>
@@ -17318,7 +17318,7 @@
         <p:spPr>
           <a:xfrm>
             <a:off x="6172200" y="2505075"/>
-            <a:ext cx="5183188" cy="1514261"/>
+            <a:ext cx="5183188" cy="849463"/>
           </a:xfrm>
         </p:spPr>
         <p:txBody>
@@ -17326,7 +17326,7 @@
           <a:lstStyle/>
           <a:p>
             <a:r>
-              <a:rPr lang="en-US" sz="2400" dirty="0"/>
+              <a:rPr lang="en-US" sz="1600" dirty="0"/>
               <a:t>Customers may change their usage on an hourly basis. There is no monthly or annual commitment for the Power BI Embedded service.</a:t>
             </a:r>
           </a:p>
@@ -17408,8 +17408,8 @@
         </p:nvSpPr>
         <p:spPr>
           <a:xfrm>
-            <a:off x="839788" y="1655612"/>
-            <a:ext cx="5157787" cy="849463"/>
+            <a:off x="839788" y="1877211"/>
+            <a:ext cx="5157787" cy="627864"/>
           </a:xfrm>
         </p:spPr>
         <p:txBody>
@@ -17417,7 +17417,7 @@
           <a:lstStyle/>
           <a:p>
             <a:r>
-              <a:rPr lang="en-US" dirty="0"/>
+              <a:rPr lang="en-US" sz="1600" dirty="0"/>
               <a:t>How does the usage of Power BI Embedded show up on my bill?</a:t>
             </a:r>
           </a:p>
@@ -17442,7 +17442,7 @@
         <p:spPr>
           <a:xfrm>
             <a:off x="839788" y="2505075"/>
-            <a:ext cx="5157787" cy="2511457"/>
+            <a:ext cx="5157787" cy="1292662"/>
           </a:xfrm>
         </p:spPr>
         <p:txBody>
@@ -17450,7 +17450,7 @@
           <a:lstStyle/>
           <a:p>
             <a:r>
-              <a:rPr lang="en-US" sz="2400" dirty="0"/>
+              <a:rPr lang="en-US" sz="1600" dirty="0"/>
               <a:t>Power BI Embedded bills on a predictable hourly rate based on the type of node(s) deployed. As long as your resource is active, you are billed even if there is no usage. To stop being billed, you need to pause your resource actively.</a:t>
             </a:r>
           </a:p>
@@ -17474,8 +17474,8 @@
         </p:nvSpPr>
         <p:spPr>
           <a:xfrm>
-            <a:off x="6172200" y="1655612"/>
-            <a:ext cx="5183188" cy="849463"/>
+            <a:off x="6172200" y="1877211"/>
+            <a:ext cx="5183188" cy="627864"/>
           </a:xfrm>
         </p:spPr>
         <p:txBody>
@@ -17483,7 +17483,7 @@
           <a:lstStyle/>
           <a:p>
             <a:r>
-              <a:rPr lang="en-US" dirty="0"/>
+              <a:rPr lang="en-US" sz="1600" dirty="0"/>
               <a:t>Who needs a Power BI Pro license for Power BI Embedded and why?</a:t>
             </a:r>
           </a:p>
@@ -17676,14 +17676,6 @@
 <file path=ppt/slides/slide23.xml><?xml version="1.0" encoding="utf-8"?>
 <p:sld xmlns:a="http://schemas.openxmlformats.org/drawingml/2006/main" xmlns:r="http://schemas.openxmlformats.org/officeDocument/2006/relationships" xmlns:p="http://schemas.openxmlformats.org/presentationml/2006/main">
   <p:cSld>
-    <p:bg>
-      <p:bgPr>
-        <a:solidFill>
-          <a:schemeClr val="bg2"/>
-        </a:solidFill>
-        <a:effectLst/>
-      </p:bgPr>
-    </p:bg>
     <p:spTree>
       <p:nvGrpSpPr>
         <p:cNvPr id="1" name=""/>
@@ -18383,14 +18375,19 @@
         </p:nvSpPr>
         <p:spPr/>
         <p:txBody>
-          <a:bodyPr>
+          <a:bodyPr vert="horz" wrap="square" lIns="91440" tIns="45720" rIns="91440" bIns="45720" rtlCol="0" anchor="ctr">
             <a:normAutofit/>
           </a:bodyPr>
           <a:lstStyle/>
           <a:p>
             <a:r>
               <a:rPr lang="en-US" sz="4400" dirty="0">
+                <a:solidFill>
+                  <a:schemeClr val="tx1"/>
+                </a:solidFill>
                 <a:latin typeface="+mn-lt"/>
+                <a:ea typeface="+mj-ea"/>
+                <a:cs typeface="+mj-cs"/>
               </a:rPr>
               <a:t>Power BI Embedding The Big Picture</a:t>
             </a:r>
@@ -19838,15 +19835,6 @@
 </file>
 
 <file path=customXml/item2.xml><?xml version="1.0" encoding="utf-8"?>
-<?mso-contentType ?>
-<FormTemplates xmlns="http://schemas.microsoft.com/sharepoint/v3/contenttype/forms">
-  <Display>DocumentLibraryForm</Display>
-  <Edit>DocumentLibraryForm</Edit>
-  <New>DocumentLibraryForm</New>
-</FormTemplates>
-</file>
-
-<file path=customXml/item3.xml><?xml version="1.0" encoding="utf-8"?>
 <ct:contentTypeSchema xmlns:ct="http://schemas.microsoft.com/office/2006/metadata/contentType" xmlns:ma="http://schemas.microsoft.com/office/2006/metadata/properties/metaAttributes" ct:_="" ma:_="" ma:contentTypeName="Document" ma:contentTypeID="0x010100D15DFA3690A15B4081582BBCC6BEAC3E" ma:contentTypeVersion="9" ma:contentTypeDescription="Create a new document." ma:contentTypeScope="" ma:versionID="642da1784587cbe85a7fdbbe4dc36103">
   <xsd:schema xmlns:xsd="http://www.w3.org/2001/XMLSchema" xmlns:xs="http://www.w3.org/2001/XMLSchema" xmlns:p="http://schemas.microsoft.com/office/2006/metadata/properties" xmlns:ns1="http://schemas.microsoft.com/sharepoint/v3" xmlns:ns2="2023ac63-7b75-4916-a9ee-591457758eee" xmlns:ns3="d9c797ad-d7c3-4982-82b7-81352a75e4a5" targetNamespace="http://schemas.microsoft.com/office/2006/metadata/properties" ma:root="true" ma:fieldsID="91198b0246576053cc55dd2c67035a89" ns1:_="" ns2:_="" ns3:_="">
     <xsd:import namespace="http://schemas.microsoft.com/sharepoint/v3"/>
@@ -20048,6 +20036,15 @@
 </ct:contentTypeSchema>
 </file>
 
+<file path=customXml/item3.xml><?xml version="1.0" encoding="utf-8"?>
+<?mso-contentType ?>
+<FormTemplates xmlns="http://schemas.microsoft.com/sharepoint/v3/contenttype/forms">
+  <Display>DocumentLibraryForm</Display>
+  <Edit>DocumentLibraryForm</Edit>
+  <New>DocumentLibraryForm</New>
+</FormTemplates>
+</file>
+
 <file path=customXml/itemProps1.xml><?xml version="1.0" encoding="utf-8"?>
 <ds:datastoreItem xmlns:ds="http://schemas.openxmlformats.org/officeDocument/2006/customXml" ds:itemID="{BAF7D529-36AB-45DA-B239-2F912F2D1610}">
   <ds:schemaRefs>
@@ -20067,14 +20064,6 @@
 </file>
 
 <file path=customXml/itemProps2.xml><?xml version="1.0" encoding="utf-8"?>
-<ds:datastoreItem xmlns:ds="http://schemas.openxmlformats.org/officeDocument/2006/customXml" ds:itemID="{F18501AF-04CF-4482-BAE1-607B49DDC378}">
-  <ds:schemaRefs>
-    <ds:schemaRef ds:uri="http://schemas.microsoft.com/sharepoint/v3/contenttype/forms"/>
-  </ds:schemaRefs>
-</ds:datastoreItem>
-</file>
-
-<file path=customXml/itemProps3.xml><?xml version="1.0" encoding="utf-8"?>
 <ds:datastoreItem xmlns:ds="http://schemas.openxmlformats.org/officeDocument/2006/customXml" ds:itemID="{255F5BEB-6AD6-480A-8556-C80C5EBC10F2}">
   <ds:schemaRefs>
     <ds:schemaRef ds:uri="http://schemas.microsoft.com/office/2006/metadata/contentType"/>
@@ -20092,4 +20081,12 @@
     <ds:schemaRef ds:uri="http://schemas.microsoft.com/internal/obd"/>
   </ds:schemaRefs>
 </ds:datastoreItem>
+</file>
+
+<file path=customXml/itemProps3.xml><?xml version="1.0" encoding="utf-8"?>
+<ds:datastoreItem xmlns:ds="http://schemas.openxmlformats.org/officeDocument/2006/customXml" ds:itemID="{F18501AF-04CF-4482-BAE1-607B49DDC378}">
+  <ds:schemaRefs>
+    <ds:schemaRef ds:uri="http://schemas.microsoft.com/sharepoint/v3/contenttype/forms"/>
+  </ds:schemaRefs>
+</ds:datastoreItem>
 </file>
</xml_diff>